<commit_message>
NEW: material cadenas, matrices estáticas, structs y memoria dinamica
</commit_message>
<xml_diff>
--- a/material/Tecnicas/ClasesTutoriales/8. ArreglosApuntadores.pptx
+++ b/material/Tecnicas/ClasesTutoriales/8. ArreglosApuntadores.pptx
@@ -3149,7 +3149,7 @@
             <a:fld id="{72F64849-FDB5-4298-A413-9D70FF7B4EB1}" type="datetimeFigureOut">
               <a:rPr lang="es-CO" smtClean="0"/>
               <a:pPr/>
-              <a:t>17/02/2020</a:t>
+              <a:t>24/02/2020</a:t>
             </a:fld>
             <a:endParaRPr lang="es-CO"/>
           </a:p>
@@ -3899,7 +3899,7 @@
             <a:fld id="{DCEF22F2-EA04-4B03-8A20-CFDE6BC87E1C}" type="datetimeFigureOut">
               <a:rPr lang="es-CO" smtClean="0"/>
               <a:pPr/>
-              <a:t>17/02/2020</a:t>
+              <a:t>24/02/2020</a:t>
             </a:fld>
             <a:endParaRPr lang="es-CO"/>
           </a:p>
@@ -4076,7 +4076,7 @@
             <a:fld id="{DCEF22F2-EA04-4B03-8A20-CFDE6BC87E1C}" type="datetimeFigureOut">
               <a:rPr lang="es-CO" smtClean="0"/>
               <a:pPr/>
-              <a:t>17/02/2020</a:t>
+              <a:t>24/02/2020</a:t>
             </a:fld>
             <a:endParaRPr lang="es-CO"/>
           </a:p>
@@ -4279,7 +4279,7 @@
             <a:fld id="{DCEF22F2-EA04-4B03-8A20-CFDE6BC87E1C}" type="datetimeFigureOut">
               <a:rPr lang="es-CO" smtClean="0"/>
               <a:pPr/>
-              <a:t>17/02/2020</a:t>
+              <a:t>24/02/2020</a:t>
             </a:fld>
             <a:endParaRPr lang="es-CO"/>
           </a:p>
@@ -4635,7 +4635,7 @@
             <a:fld id="{DCEF22F2-EA04-4B03-8A20-CFDE6BC87E1C}" type="datetimeFigureOut">
               <a:rPr lang="es-CO" smtClean="0"/>
               <a:pPr/>
-              <a:t>17/02/2020</a:t>
+              <a:t>24/02/2020</a:t>
             </a:fld>
             <a:endParaRPr lang="es-CO"/>
           </a:p>
@@ -4920,7 +4920,7 @@
             <a:fld id="{DCEF22F2-EA04-4B03-8A20-CFDE6BC87E1C}" type="datetimeFigureOut">
               <a:rPr lang="es-CO" smtClean="0"/>
               <a:pPr/>
-              <a:t>17/02/2020</a:t>
+              <a:t>24/02/2020</a:t>
             </a:fld>
             <a:endParaRPr lang="es-CO"/>
           </a:p>
@@ -5339,7 +5339,7 @@
             <a:fld id="{DCEF22F2-EA04-4B03-8A20-CFDE6BC87E1C}" type="datetimeFigureOut">
               <a:rPr lang="es-CO" smtClean="0"/>
               <a:pPr/>
-              <a:t>17/02/2020</a:t>
+              <a:t>24/02/2020</a:t>
             </a:fld>
             <a:endParaRPr lang="es-CO"/>
           </a:p>
@@ -5454,7 +5454,7 @@
             <a:fld id="{DCEF22F2-EA04-4B03-8A20-CFDE6BC87E1C}" type="datetimeFigureOut">
               <a:rPr lang="es-CO" smtClean="0"/>
               <a:pPr/>
-              <a:t>17/02/2020</a:t>
+              <a:t>24/02/2020</a:t>
             </a:fld>
             <a:endParaRPr lang="es-CO"/>
           </a:p>
@@ -5546,7 +5546,7 @@
             <a:fld id="{DCEF22F2-EA04-4B03-8A20-CFDE6BC87E1C}" type="datetimeFigureOut">
               <a:rPr lang="es-CO" smtClean="0"/>
               <a:pPr/>
-              <a:t>17/02/2020</a:t>
+              <a:t>24/02/2020</a:t>
             </a:fld>
             <a:endParaRPr lang="es-CO"/>
           </a:p>
@@ -5820,7 +5820,7 @@
             <a:fld id="{DCEF22F2-EA04-4B03-8A20-CFDE6BC87E1C}" type="datetimeFigureOut">
               <a:rPr lang="es-CO" smtClean="0"/>
               <a:pPr/>
-              <a:t>17/02/2020</a:t>
+              <a:t>24/02/2020</a:t>
             </a:fld>
             <a:endParaRPr lang="es-CO"/>
           </a:p>
@@ -6074,7 +6074,7 @@
             <a:fld id="{DCEF22F2-EA04-4B03-8A20-CFDE6BC87E1C}" type="datetimeFigureOut">
               <a:rPr lang="es-CO" smtClean="0"/>
               <a:pPr/>
-              <a:t>17/02/2020</a:t>
+              <a:t>24/02/2020</a:t>
             </a:fld>
             <a:endParaRPr lang="es-CO"/>
           </a:p>
@@ -6284,7 +6284,7 @@
             <a:fld id="{DCEF22F2-EA04-4B03-8A20-CFDE6BC87E1C}" type="datetimeFigureOut">
               <a:rPr lang="es-CO" smtClean="0"/>
               <a:pPr/>
-              <a:t>17/02/2020</a:t>
+              <a:t>24/02/2020</a:t>
             </a:fld>
             <a:endParaRPr lang="es-CO"/>
           </a:p>
@@ -13802,7 +13802,7 @@
         <p:spPr>
           <a:xfrm>
             <a:off x="503548" y="1772816"/>
-            <a:ext cx="8136904" cy="2952328"/>
+            <a:ext cx="8136904" cy="3312368"/>
           </a:xfrm>
           <a:prstGeom prst="rect">
             <a:avLst/>

</xml_diff>